<commit_message>
More code and new slides for lambdas lecture
git-svn-id: https://svn.code.sf.net/p/cpp-lects-rus/code/trunk@250 39143b06-f351-456c-9f92-4cd32fad6823
</commit_message>
<xml_diff>
--- a/slides/sep2017/11-seq-conts.pptx
+++ b/slides/sep2017/11-seq-conts.pptx
@@ -277,7 +277,7 @@
           <a:p>
             <a:fld id="{819CB406-1E88-492A-A8A4-D94C05F6CFE4}" type="datetimeFigureOut">
               <a:rPr lang="en-US" smtClean="0"/>
-              <a:t>3/1/2018</a:t>
+              <a:t>3/14/2018</a:t>
             </a:fld>
             <a:endParaRPr lang="en-US"/>
           </a:p>
@@ -826,7 +826,7 @@
             <a:fld id="{96DFF08F-DC6B-4601-B491-B0F83F6DD2DA}" type="datetimeFigureOut">
               <a:rPr lang="en-US" dirty="0"/>
               <a:pPr/>
-              <a:t>3/1/2018</a:t>
+              <a:t>3/14/2018</a:t>
             </a:fld>
             <a:endParaRPr lang="en-US" dirty="0"/>
           </a:p>
@@ -1043,7 +1043,7 @@
           <a:p>
             <a:fld id="{96DFF08F-DC6B-4601-B491-B0F83F6DD2DA}" type="datetimeFigureOut">
               <a:rPr lang="en-US" dirty="0"/>
-              <a:t>3/1/2018</a:t>
+              <a:t>3/14/2018</a:t>
             </a:fld>
             <a:endParaRPr lang="en-US" dirty="0"/>
           </a:p>
@@ -1218,7 +1218,7 @@
           <a:p>
             <a:fld id="{96DFF08F-DC6B-4601-B491-B0F83F6DD2DA}" type="datetimeFigureOut">
               <a:rPr lang="en-US" dirty="0"/>
-              <a:t>3/1/2018</a:t>
+              <a:t>3/14/2018</a:t>
             </a:fld>
             <a:endParaRPr lang="en-US" dirty="0"/>
           </a:p>
@@ -1383,7 +1383,7 @@
           <a:p>
             <a:fld id="{96DFF08F-DC6B-4601-B491-B0F83F6DD2DA}" type="datetimeFigureOut">
               <a:rPr lang="en-US" dirty="0"/>
-              <a:t>3/1/2018</a:t>
+              <a:t>3/14/2018</a:t>
             </a:fld>
             <a:endParaRPr lang="en-US" dirty="0"/>
           </a:p>
@@ -1629,7 +1629,7 @@
           <a:p>
             <a:fld id="{96DFF08F-DC6B-4601-B491-B0F83F6DD2DA}" type="datetimeFigureOut">
               <a:rPr lang="en-US" dirty="0"/>
-              <a:t>3/1/2018</a:t>
+              <a:t>3/14/2018</a:t>
             </a:fld>
             <a:endParaRPr lang="en-US" dirty="0"/>
           </a:p>
@@ -1947,7 +1947,7 @@
           <a:p>
             <a:fld id="{96DFF08F-DC6B-4601-B491-B0F83F6DD2DA}" type="datetimeFigureOut">
               <a:rPr lang="en-US" dirty="0"/>
-              <a:t>3/1/2018</a:t>
+              <a:t>3/14/2018</a:t>
             </a:fld>
             <a:endParaRPr lang="en-US" dirty="0"/>
           </a:p>
@@ -2366,7 +2366,7 @@
           <a:p>
             <a:fld id="{96DFF08F-DC6B-4601-B491-B0F83F6DD2DA}" type="datetimeFigureOut">
               <a:rPr lang="en-US" dirty="0"/>
-              <a:t>3/1/2018</a:t>
+              <a:t>3/14/2018</a:t>
             </a:fld>
             <a:endParaRPr lang="en-US" dirty="0"/>
           </a:p>
@@ -2479,7 +2479,7 @@
           <a:p>
             <a:fld id="{96DFF08F-DC6B-4601-B491-B0F83F6DD2DA}" type="datetimeFigureOut">
               <a:rPr lang="en-US" dirty="0"/>
-              <a:t>3/1/2018</a:t>
+              <a:t>3/14/2018</a:t>
             </a:fld>
             <a:endParaRPr lang="en-US" dirty="0"/>
           </a:p>
@@ -2569,7 +2569,7 @@
           <a:p>
             <a:fld id="{96DFF08F-DC6B-4601-B491-B0F83F6DD2DA}" type="datetimeFigureOut">
               <a:rPr lang="en-US" dirty="0"/>
-              <a:t>3/1/2018</a:t>
+              <a:t>3/14/2018</a:t>
             </a:fld>
             <a:endParaRPr lang="en-US" dirty="0"/>
           </a:p>
@@ -2854,7 +2854,7 @@
           <a:p>
             <a:fld id="{96DFF08F-DC6B-4601-B491-B0F83F6DD2DA}" type="datetimeFigureOut">
               <a:rPr lang="en-US" dirty="0"/>
-              <a:t>3/1/2018</a:t>
+              <a:t>3/14/2018</a:t>
             </a:fld>
             <a:endParaRPr lang="en-US" dirty="0"/>
           </a:p>
@@ -3121,7 +3121,7 @@
           <a:p>
             <a:fld id="{96DFF08F-DC6B-4601-B491-B0F83F6DD2DA}" type="datetimeFigureOut">
               <a:rPr lang="en-US" dirty="0"/>
-              <a:t>3/1/2018</a:t>
+              <a:t>3/14/2018</a:t>
             </a:fld>
             <a:endParaRPr lang="en-US" dirty="0"/>
           </a:p>
@@ -3370,7 +3370,7 @@
             <a:fld id="{96DFF08F-DC6B-4601-B491-B0F83F6DD2DA}" type="datetimeFigureOut">
               <a:rPr lang="en-US" dirty="0"/>
               <a:pPr/>
-              <a:t>3/1/2018</a:t>
+              <a:t>3/14/2018</a:t>
             </a:fld>
             <a:endParaRPr lang="en-US" dirty="0"/>
           </a:p>
@@ -29215,8 +29215,23 @@
               <a:rPr lang="en-US" dirty="0" smtClean="0">
                 <a:latin typeface="Consolas" panose="020B0609020204030204" pitchFamily="49" charset="0"/>
               </a:rPr>
-              <a:t>v4 = pow (v1, 2); // 4, 9, 25, 29</a:t>
-            </a:r>
+              <a:t>v4 = pow (v1, 2); // 4, 9, 25</a:t>
+            </a:r>
+            <a:r>
+              <a:rPr lang="en-US" smtClean="0">
+                <a:latin typeface="Consolas" panose="020B0609020204030204" pitchFamily="49" charset="0"/>
+              </a:rPr>
+              <a:t>, </a:t>
+            </a:r>
+            <a:r>
+              <a:rPr lang="en-US" smtClean="0">
+                <a:latin typeface="Consolas" panose="020B0609020204030204" pitchFamily="49" charset="0"/>
+              </a:rPr>
+              <a:t>49</a:t>
+            </a:r>
+            <a:endParaRPr lang="en-US" dirty="0" smtClean="0">
+              <a:latin typeface="Consolas" panose="020B0609020204030204" pitchFamily="49" charset="0"/>
+            </a:endParaRPr>
           </a:p>
           <a:p>
             <a:pPr marL="45720" indent="0">
@@ -29425,22 +29440,22 @@
               </a:rPr>
             </a:br>
             <a:r>
-              <a:rPr lang="en-US" dirty="0" smtClean="0">
+              <a:rPr lang="en-US" smtClean="0">
                 <a:latin typeface="Consolas" panose="020B0609020204030204" pitchFamily="49" charset="0"/>
               </a:rPr>
               <a:t>row[red</a:t>
             </a:r>
             <a:r>
-              <a:rPr lang="en-US" dirty="0">
-                <a:latin typeface="Consolas" panose="020B0609020204030204" pitchFamily="49" charset="0"/>
-              </a:rPr>
-              <a:t>]=</a:t>
-            </a:r>
-            <a:r>
-              <a:rPr lang="en-US" dirty="0" smtClean="0">
-                <a:latin typeface="Consolas" panose="020B0609020204030204" pitchFamily="49" charset="0"/>
-              </a:rPr>
-              <a:t>255; // </a:t>
+              <a:rPr lang="en-US" smtClean="0">
+                <a:latin typeface="Consolas" panose="020B0609020204030204" pitchFamily="49" charset="0"/>
+              </a:rPr>
+              <a:t>] = 255</a:t>
+            </a:r>
+            <a:r>
+              <a:rPr lang="en-US" dirty="0" smtClean="0">
+                <a:latin typeface="Consolas" panose="020B0609020204030204" pitchFamily="49" charset="0"/>
+              </a:rPr>
+              <a:t>; // </a:t>
             </a:r>
             <a:r>
               <a:rPr lang="ru-RU" dirty="0" smtClean="0">
@@ -29951,13 +29966,7 @@
               <a:rPr lang="en-US" smtClean="0">
                 <a:latin typeface="Consolas" panose="020B0609020204030204" pitchFamily="49" charset="0"/>
               </a:rPr>
-              <a:t>int arr[4</a:t>
-            </a:r>
-            <a:r>
-              <a:rPr lang="en-US" smtClean="0">
-                <a:latin typeface="Consolas" panose="020B0609020204030204" pitchFamily="49" charset="0"/>
-              </a:rPr>
-              <a:t>] = {1, 2, 3, 4}; // </a:t>
+              <a:t>int arr[4] = {1, 2, 3, 4}; // </a:t>
             </a:r>
             <a:r>
               <a:rPr lang="ru-RU" smtClean="0">
@@ -29974,25 +29983,7 @@
               <a:rPr lang="en-US" smtClean="0">
                 <a:latin typeface="Consolas" panose="020B0609020204030204" pitchFamily="49" charset="0"/>
               </a:rPr>
-              <a:t>array&lt;int</a:t>
-            </a:r>
-            <a:r>
-              <a:rPr lang="en-US" smtClean="0">
-                <a:latin typeface="Consolas" panose="020B0609020204030204" pitchFamily="49" charset="0"/>
-              </a:rPr>
-              <a:t>, 4</a:t>
-            </a:r>
-            <a:r>
-              <a:rPr lang="en-US" smtClean="0">
-                <a:latin typeface="Consolas" panose="020B0609020204030204" pitchFamily="49" charset="0"/>
-              </a:rPr>
-              <a:t>&gt; arr </a:t>
-            </a:r>
-            <a:r>
-              <a:rPr lang="en-US" smtClean="0">
-                <a:latin typeface="Consolas" panose="020B0609020204030204" pitchFamily="49" charset="0"/>
-              </a:rPr>
-              <a:t>= {1, 2, 3, 4}; // </a:t>
+              <a:t>array&lt;int, 4&gt; arr = {1, 2, 3, 4}; // </a:t>
             </a:r>
             <a:r>
               <a:rPr lang="ru-RU" smtClean="0">

</xml_diff>

<commit_message>
More allocator slides draft and Hinnant example
git-svn-id: https://svn.code.sf.net/p/cpp-lects-rus/code/trunk@259 39143b06-f351-456c-9f92-4cd32fad6823
</commit_message>
<xml_diff>
--- a/slides/sep2017/11-seq-conts.pptx
+++ b/slides/sep2017/11-seq-conts.pptx
@@ -277,7 +277,7 @@
           <a:p>
             <a:fld id="{819CB406-1E88-492A-A8A4-D94C05F6CFE4}" type="datetimeFigureOut">
               <a:rPr lang="en-US" smtClean="0"/>
-              <a:t>3/14/2018</a:t>
+              <a:t>5/20/2018</a:t>
             </a:fld>
             <a:endParaRPr lang="en-US"/>
           </a:p>
@@ -826,7 +826,7 @@
             <a:fld id="{96DFF08F-DC6B-4601-B491-B0F83F6DD2DA}" type="datetimeFigureOut">
               <a:rPr lang="en-US" dirty="0"/>
               <a:pPr/>
-              <a:t>3/14/2018</a:t>
+              <a:t>5/20/2018</a:t>
             </a:fld>
             <a:endParaRPr lang="en-US" dirty="0"/>
           </a:p>
@@ -1043,7 +1043,7 @@
           <a:p>
             <a:fld id="{96DFF08F-DC6B-4601-B491-B0F83F6DD2DA}" type="datetimeFigureOut">
               <a:rPr lang="en-US" dirty="0"/>
-              <a:t>3/14/2018</a:t>
+              <a:t>5/20/2018</a:t>
             </a:fld>
             <a:endParaRPr lang="en-US" dirty="0"/>
           </a:p>
@@ -1218,7 +1218,7 @@
           <a:p>
             <a:fld id="{96DFF08F-DC6B-4601-B491-B0F83F6DD2DA}" type="datetimeFigureOut">
               <a:rPr lang="en-US" dirty="0"/>
-              <a:t>3/14/2018</a:t>
+              <a:t>5/20/2018</a:t>
             </a:fld>
             <a:endParaRPr lang="en-US" dirty="0"/>
           </a:p>
@@ -1383,7 +1383,7 @@
           <a:p>
             <a:fld id="{96DFF08F-DC6B-4601-B491-B0F83F6DD2DA}" type="datetimeFigureOut">
               <a:rPr lang="en-US" dirty="0"/>
-              <a:t>3/14/2018</a:t>
+              <a:t>5/20/2018</a:t>
             </a:fld>
             <a:endParaRPr lang="en-US" dirty="0"/>
           </a:p>
@@ -1629,7 +1629,7 @@
           <a:p>
             <a:fld id="{96DFF08F-DC6B-4601-B491-B0F83F6DD2DA}" type="datetimeFigureOut">
               <a:rPr lang="en-US" dirty="0"/>
-              <a:t>3/14/2018</a:t>
+              <a:t>5/20/2018</a:t>
             </a:fld>
             <a:endParaRPr lang="en-US" dirty="0"/>
           </a:p>
@@ -1947,7 +1947,7 @@
           <a:p>
             <a:fld id="{96DFF08F-DC6B-4601-B491-B0F83F6DD2DA}" type="datetimeFigureOut">
               <a:rPr lang="en-US" dirty="0"/>
-              <a:t>3/14/2018</a:t>
+              <a:t>5/20/2018</a:t>
             </a:fld>
             <a:endParaRPr lang="en-US" dirty="0"/>
           </a:p>
@@ -2366,7 +2366,7 @@
           <a:p>
             <a:fld id="{96DFF08F-DC6B-4601-B491-B0F83F6DD2DA}" type="datetimeFigureOut">
               <a:rPr lang="en-US" dirty="0"/>
-              <a:t>3/14/2018</a:t>
+              <a:t>5/20/2018</a:t>
             </a:fld>
             <a:endParaRPr lang="en-US" dirty="0"/>
           </a:p>
@@ -2479,7 +2479,7 @@
           <a:p>
             <a:fld id="{96DFF08F-DC6B-4601-B491-B0F83F6DD2DA}" type="datetimeFigureOut">
               <a:rPr lang="en-US" dirty="0"/>
-              <a:t>3/14/2018</a:t>
+              <a:t>5/20/2018</a:t>
             </a:fld>
             <a:endParaRPr lang="en-US" dirty="0"/>
           </a:p>
@@ -2569,7 +2569,7 @@
           <a:p>
             <a:fld id="{96DFF08F-DC6B-4601-B491-B0F83F6DD2DA}" type="datetimeFigureOut">
               <a:rPr lang="en-US" dirty="0"/>
-              <a:t>3/14/2018</a:t>
+              <a:t>5/20/2018</a:t>
             </a:fld>
             <a:endParaRPr lang="en-US" dirty="0"/>
           </a:p>
@@ -2854,7 +2854,7 @@
           <a:p>
             <a:fld id="{96DFF08F-DC6B-4601-B491-B0F83F6DD2DA}" type="datetimeFigureOut">
               <a:rPr lang="en-US" dirty="0"/>
-              <a:t>3/14/2018</a:t>
+              <a:t>5/20/2018</a:t>
             </a:fld>
             <a:endParaRPr lang="en-US" dirty="0"/>
           </a:p>
@@ -3121,7 +3121,7 @@
           <a:p>
             <a:fld id="{96DFF08F-DC6B-4601-B491-B0F83F6DD2DA}" type="datetimeFigureOut">
               <a:rPr lang="en-US" dirty="0"/>
-              <a:t>3/14/2018</a:t>
+              <a:t>5/20/2018</a:t>
             </a:fld>
             <a:endParaRPr lang="en-US" dirty="0"/>
           </a:p>
@@ -3370,7 +3370,7 @@
             <a:fld id="{96DFF08F-DC6B-4601-B491-B0F83F6DD2DA}" type="datetimeFigureOut">
               <a:rPr lang="en-US" dirty="0"/>
               <a:pPr/>
-              <a:t>3/14/2018</a:t>
+              <a:t>5/20/2018</a:t>
             </a:fld>
             <a:endParaRPr lang="en-US" dirty="0"/>
           </a:p>
@@ -29221,13 +29221,7 @@
               <a:rPr lang="en-US" smtClean="0">
                 <a:latin typeface="Consolas" panose="020B0609020204030204" pitchFamily="49" charset="0"/>
               </a:rPr>
-              <a:t>, </a:t>
-            </a:r>
-            <a:r>
-              <a:rPr lang="en-US" smtClean="0">
-                <a:latin typeface="Consolas" panose="020B0609020204030204" pitchFamily="49" charset="0"/>
-              </a:rPr>
-              <a:t>49</a:t>
+              <a:t>, 49</a:t>
             </a:r>
             <a:endParaRPr lang="en-US" dirty="0" smtClean="0">
               <a:latin typeface="Consolas" panose="020B0609020204030204" pitchFamily="49" charset="0"/>
@@ -29443,13 +29437,7 @@
               <a:rPr lang="en-US" smtClean="0">
                 <a:latin typeface="Consolas" panose="020B0609020204030204" pitchFamily="49" charset="0"/>
               </a:rPr>
-              <a:t>row[red</a:t>
-            </a:r>
-            <a:r>
-              <a:rPr lang="en-US" smtClean="0">
-                <a:latin typeface="Consolas" panose="020B0609020204030204" pitchFamily="49" charset="0"/>
-              </a:rPr>
-              <a:t>] = 255</a:t>
+              <a:t>row[red] = 255</a:t>
             </a:r>
             <a:r>
               <a:rPr lang="en-US" dirty="0" smtClean="0">

</xml_diff>